<commit_message>
Fix presentation file of lecture 08
</commit_message>
<xml_diff>
--- a/docs/presentations/08-GuteRise.pptx
+++ b/docs/presentations/08-GuteRise.pptx
@@ -213,7 +213,7 @@
           <a:p>
             <a:fld id="{9197E104-22AF-7344-93DF-EE23AD2FF7C9}" type="datetimeFigureOut">
               <a:rPr lang="en-US" smtClean="0"/>
-              <a:t>06/07/2017</a:t>
+              <a:t>06/08/2017</a:t>
             </a:fld>
             <a:endParaRPr lang="en-US" dirty="0"/>
           </a:p>
@@ -378,7 +378,7 @@
           <a:p>
             <a:fld id="{EB3E700C-39B5-4BEE-AE3D-F2FF3A17B434}" type="datetimeFigureOut">
               <a:rPr lang="en-US" smtClean="0"/>
-              <a:t>06/07/2017</a:t>
+              <a:t>06/08/2017</a:t>
             </a:fld>
             <a:endParaRPr lang="en-US" dirty="0"/>
           </a:p>
@@ -690,6 +690,21 @@
           <a:lstStyle/>
           <a:p>
             <a:r>
+              <a:rPr lang="en-US" dirty="0" err="1"/>
+              <a:t>Gr_files_table</a:t>
+            </a:r>
+            <a:r>
+              <a:rPr lang="en-US" dirty="0"/>
+              <a:t>, </a:t>
+            </a:r>
+            <a:r>
+              <a:rPr lang="en-US" dirty="0" err="1"/>
+              <a:t>Gr_users_table</a:t>
+            </a:r>
+            <a:endParaRPr lang="en-US" dirty="0"/>
+          </a:p>
+          <a:p>
+            <a:r>
               <a:rPr lang="en-US" dirty="0"/>
               <a:t>File type is obtained by file extension using mime type class object of Ruby on rails. </a:t>
             </a:r>
@@ -699,6 +714,17 @@
               <a:rPr lang="en-US" dirty="0"/>
               <a:t>File Name and File size is obtained from database, so run command “rails g model attachment filename” then store the data to database.</a:t>
             </a:r>
+          </a:p>
+          <a:p>
+            <a:r>
+              <a:rPr lang="en-US" dirty="0"/>
+              <a:t>File timestamp obtain from ruby method </a:t>
+            </a:r>
+            <a:r>
+              <a:rPr lang="en-US" dirty="0" err="1"/>
+              <a:t>mtime</a:t>
+            </a:r>
+            <a:endParaRPr lang="en-US" dirty="0"/>
           </a:p>
         </p:txBody>
       </p:sp>
@@ -2955,77 +2981,9 @@
           <a:chExt cx="0" cy="0"/>
         </a:xfrm>
       </p:grpSpPr>
-      <p:sp>
-        <p:nvSpPr>
-          <p:cNvPr id="5" name="タイトル 4"/>
-          <p:cNvSpPr>
-            <a:spLocks noGrp="1"/>
-          </p:cNvSpPr>
-          <p:nvPr>
-            <p:ph type="title"/>
-          </p:nvPr>
-        </p:nvSpPr>
-        <p:spPr/>
-        <p:txBody>
-          <a:bodyPr/>
-          <a:lstStyle/>
-          <a:p>
-            <a:r>
-              <a:rPr lang="en-US" dirty="0"/>
-              <a:t>What to store in the Database</a:t>
-            </a:r>
-          </a:p>
-        </p:txBody>
-      </p:sp>
-      <p:sp>
-        <p:nvSpPr>
-          <p:cNvPr id="3" name="フッター プレースホルダー 2"/>
-          <p:cNvSpPr>
-            <a:spLocks noGrp="1"/>
-          </p:cNvSpPr>
-          <p:nvPr>
-            <p:ph type="ftr" sz="quarter" idx="11"/>
-          </p:nvPr>
-        </p:nvSpPr>
-        <p:spPr/>
-        <p:txBody>
-          <a:bodyPr/>
-          <a:lstStyle/>
-          <a:p>
-            <a:r>
-              <a:rPr lang="en-US"/>
-              <a:t>Copyright (C) 2017 GuteReise All Rights Reserved.</a:t>
-            </a:r>
-            <a:endParaRPr lang="en-US" dirty="0"/>
-          </a:p>
-        </p:txBody>
-      </p:sp>
-      <p:sp>
-        <p:nvSpPr>
-          <p:cNvPr id="4" name="スライド番号プレースホルダー 3"/>
-          <p:cNvSpPr>
-            <a:spLocks noGrp="1"/>
-          </p:cNvSpPr>
-          <p:nvPr>
-            <p:ph type="sldNum" sz="quarter" idx="12"/>
-          </p:nvPr>
-        </p:nvSpPr>
-        <p:spPr/>
-        <p:txBody>
-          <a:bodyPr/>
-          <a:lstStyle/>
-          <a:p>
-            <a:fld id="{66BC0139-E719-4B0D-B3B4-0CD99AC2D8F3}" type="slidenum">
-              <a:rPr lang="en-US" smtClean="0"/>
-              <a:t>6</a:t>
-            </a:fld>
-            <a:endParaRPr lang="en-US" dirty="0"/>
-          </a:p>
-        </p:txBody>
-      </p:sp>
       <p:pic>
         <p:nvPicPr>
-          <p:cNvPr id="10" name="図 9"/>
+          <p:cNvPr id="38" name="Picture 37"/>
           <p:cNvPicPr>
             <a:picLocks noChangeAspect="1"/>
           </p:cNvPicPr>
@@ -3039,14 +2997,217 @@
         </p:blipFill>
         <p:spPr>
           <a:xfrm>
-            <a:off x="4045106" y="2127618"/>
-            <a:ext cx="4101788" cy="3747352"/>
+            <a:off x="2163434" y="1367482"/>
+            <a:ext cx="4635260" cy="4729754"/>
           </a:xfrm>
           <a:prstGeom prst="rect">
             <a:avLst/>
           </a:prstGeom>
         </p:spPr>
       </p:pic>
+      <p:sp>
+        <p:nvSpPr>
+          <p:cNvPr id="5" name="タイトル 4"/>
+          <p:cNvSpPr>
+            <a:spLocks noGrp="1"/>
+          </p:cNvSpPr>
+          <p:nvPr>
+            <p:ph type="title"/>
+          </p:nvPr>
+        </p:nvSpPr>
+        <p:spPr/>
+        <p:txBody>
+          <a:bodyPr/>
+          <a:lstStyle/>
+          <a:p>
+            <a:r>
+              <a:rPr lang="en-US" dirty="0"/>
+              <a:t>What to store in the Database</a:t>
+            </a:r>
+          </a:p>
+        </p:txBody>
+      </p:sp>
+      <p:sp>
+        <p:nvSpPr>
+          <p:cNvPr id="3" name="フッター プレースホルダー 2"/>
+          <p:cNvSpPr>
+            <a:spLocks noGrp="1"/>
+          </p:cNvSpPr>
+          <p:nvPr>
+            <p:ph type="ftr" sz="quarter" idx="11"/>
+          </p:nvPr>
+        </p:nvSpPr>
+        <p:spPr/>
+        <p:txBody>
+          <a:bodyPr/>
+          <a:lstStyle/>
+          <a:p>
+            <a:r>
+              <a:rPr lang="en-US"/>
+              <a:t>Copyright (C) 2017 GuteReise All Rights Reserved.</a:t>
+            </a:r>
+            <a:endParaRPr lang="en-US" dirty="0"/>
+          </a:p>
+        </p:txBody>
+      </p:sp>
+      <p:sp>
+        <p:nvSpPr>
+          <p:cNvPr id="4" name="スライド番号プレースホルダー 3"/>
+          <p:cNvSpPr>
+            <a:spLocks noGrp="1"/>
+          </p:cNvSpPr>
+          <p:nvPr>
+            <p:ph type="sldNum" sz="quarter" idx="12"/>
+          </p:nvPr>
+        </p:nvSpPr>
+        <p:spPr/>
+        <p:txBody>
+          <a:bodyPr/>
+          <a:lstStyle/>
+          <a:p>
+            <a:fld id="{66BC0139-E719-4B0D-B3B4-0CD99AC2D8F3}" type="slidenum">
+              <a:rPr lang="en-US" smtClean="0"/>
+              <a:t>6</a:t>
+            </a:fld>
+            <a:endParaRPr lang="en-US" dirty="0"/>
+          </a:p>
+        </p:txBody>
+      </p:sp>
+      <p:pic>
+        <p:nvPicPr>
+          <p:cNvPr id="22" name="Picture 21"/>
+          <p:cNvPicPr>
+            <a:picLocks noChangeAspect="1"/>
+          </p:cNvPicPr>
+          <p:nvPr/>
+        </p:nvPicPr>
+        <p:blipFill>
+          <a:blip r:embed="rId4"/>
+          <a:stretch>
+            <a:fillRect/>
+          </a:stretch>
+        </p:blipFill>
+        <p:spPr>
+          <a:xfrm>
+            <a:off x="6955048" y="2658370"/>
+            <a:ext cx="4837980" cy="2147978"/>
+          </a:xfrm>
+          <a:prstGeom prst="rect">
+            <a:avLst/>
+          </a:prstGeom>
+        </p:spPr>
+      </p:pic>
+      <p:cxnSp>
+        <p:nvCxnSpPr>
+          <p:cNvPr id="24" name="Straight Connector 23"/>
+          <p:cNvCxnSpPr>
+            <a:cxnSpLocks/>
+          </p:cNvCxnSpPr>
+          <p:nvPr/>
+        </p:nvCxnSpPr>
+        <p:spPr>
+          <a:xfrm>
+            <a:off x="2530416" y="3732359"/>
+            <a:ext cx="3749614" cy="0"/>
+          </a:xfrm>
+          <a:prstGeom prst="line">
+            <a:avLst/>
+          </a:prstGeom>
+          <a:ln w="57150">
+            <a:solidFill>
+              <a:srgbClr val="3D5AFE"/>
+            </a:solidFill>
+          </a:ln>
+        </p:spPr>
+        <p:style>
+          <a:lnRef idx="3">
+            <a:schemeClr val="dk1"/>
+          </a:lnRef>
+          <a:fillRef idx="0">
+            <a:schemeClr val="dk1"/>
+          </a:fillRef>
+          <a:effectRef idx="2">
+            <a:schemeClr val="dk1"/>
+          </a:effectRef>
+          <a:fontRef idx="minor">
+            <a:schemeClr val="tx1"/>
+          </a:fontRef>
+        </p:style>
+      </p:cxnSp>
+      <p:cxnSp>
+        <p:nvCxnSpPr>
+          <p:cNvPr id="26" name="Straight Connector 25"/>
+          <p:cNvCxnSpPr>
+            <a:cxnSpLocks/>
+          </p:cNvCxnSpPr>
+          <p:nvPr/>
+        </p:nvCxnSpPr>
+        <p:spPr>
+          <a:xfrm>
+            <a:off x="2526103" y="4740206"/>
+            <a:ext cx="3942270" cy="0"/>
+          </a:xfrm>
+          <a:prstGeom prst="line">
+            <a:avLst/>
+          </a:prstGeom>
+          <a:ln w="57150">
+            <a:solidFill>
+              <a:srgbClr val="3D5AFE"/>
+            </a:solidFill>
+          </a:ln>
+        </p:spPr>
+        <p:style>
+          <a:lnRef idx="3">
+            <a:schemeClr val="dk1"/>
+          </a:lnRef>
+          <a:fillRef idx="0">
+            <a:schemeClr val="dk1"/>
+          </a:fillRef>
+          <a:effectRef idx="2">
+            <a:schemeClr val="dk1"/>
+          </a:effectRef>
+          <a:fontRef idx="minor">
+            <a:schemeClr val="tx1"/>
+          </a:fontRef>
+        </p:style>
+      </p:cxnSp>
+      <p:cxnSp>
+        <p:nvCxnSpPr>
+          <p:cNvPr id="28" name="Straight Connector 27"/>
+          <p:cNvCxnSpPr>
+            <a:cxnSpLocks/>
+          </p:cNvCxnSpPr>
+          <p:nvPr/>
+        </p:nvCxnSpPr>
+        <p:spPr>
+          <a:xfrm>
+            <a:off x="2526103" y="4229815"/>
+            <a:ext cx="4116237" cy="0"/>
+          </a:xfrm>
+          <a:prstGeom prst="line">
+            <a:avLst/>
+          </a:prstGeom>
+          <a:ln w="57150">
+            <a:solidFill>
+              <a:srgbClr val="3D5AFE"/>
+            </a:solidFill>
+          </a:ln>
+        </p:spPr>
+        <p:style>
+          <a:lnRef idx="3">
+            <a:schemeClr val="dk1"/>
+          </a:lnRef>
+          <a:fillRef idx="0">
+            <a:schemeClr val="dk1"/>
+          </a:fillRef>
+          <a:effectRef idx="2">
+            <a:schemeClr val="dk1"/>
+          </a:effectRef>
+          <a:fontRef idx="minor">
+            <a:schemeClr val="tx1"/>
+          </a:fontRef>
+        </p:style>
+      </p:cxnSp>
     </p:spTree>
     <p:extLst>
       <p:ext uri="{BB962C8B-B14F-4D97-AF65-F5344CB8AC3E}">

</xml_diff>